<commit_message>
Fixed Zoom-in error + allow auto-zoom reload
--HG--
branch : feature
</commit_message>
<xml_diff>
--- a/doc/Test Scenarios - Auto Zoom.pptx
+++ b/doc/Test Scenarios - Auto Zoom.pptx
@@ -230,7 +230,7 @@
           <a:p>
             <a:fld id="{DF710810-EBA0-48A2-9245-5593D4614D0A}" type="datetimeFigureOut">
               <a:rPr lang="en-SG" smtClean="0"/>
-              <a:t>12/2/2014</a:t>
+              <a:t>14/2/2014</a:t>
             </a:fld>
             <a:endParaRPr lang="en-SG"/>
           </a:p>
@@ -771,7 +771,7 @@
           <a:p>
             <a:fld id="{A66DBF1E-15DC-40BE-AE96-A63F45FD4F4E}" type="datetimeFigureOut">
               <a:rPr lang="en-SG" smtClean="0"/>
-              <a:t>12/2/2014</a:t>
+              <a:t>14/2/2014</a:t>
             </a:fld>
             <a:endParaRPr lang="en-SG"/>
           </a:p>
@@ -941,7 +941,7 @@
           <a:p>
             <a:fld id="{A66DBF1E-15DC-40BE-AE96-A63F45FD4F4E}" type="datetimeFigureOut">
               <a:rPr lang="en-SG" smtClean="0"/>
-              <a:t>12/2/2014</a:t>
+              <a:t>14/2/2014</a:t>
             </a:fld>
             <a:endParaRPr lang="en-SG"/>
           </a:p>
@@ -1121,7 +1121,7 @@
           <a:p>
             <a:fld id="{A66DBF1E-15DC-40BE-AE96-A63F45FD4F4E}" type="datetimeFigureOut">
               <a:rPr lang="en-SG" smtClean="0"/>
-              <a:t>12/2/2014</a:t>
+              <a:t>14/2/2014</a:t>
             </a:fld>
             <a:endParaRPr lang="en-SG"/>
           </a:p>
@@ -1370,7 +1370,7 @@
                 </a:solidFill>
               </a:rPr>
               <a:pPr/>
-              <a:t>2/12/2014</a:t>
+              <a:t>2/14/2014</a:t>
             </a:fld>
             <a:endParaRPr lang="en-US">
               <a:solidFill>
@@ -1572,7 +1572,7 @@
                 </a:solidFill>
               </a:rPr>
               <a:pPr/>
-              <a:t>2/12/2014</a:t>
+              <a:t>2/14/2014</a:t>
             </a:fld>
             <a:endParaRPr lang="en-US">
               <a:solidFill>
@@ -1850,7 +1850,7 @@
                 </a:solidFill>
               </a:rPr>
               <a:pPr/>
-              <a:t>2/12/2014</a:t>
+              <a:t>2/14/2014</a:t>
             </a:fld>
             <a:endParaRPr lang="en-US">
               <a:solidFill>
@@ -2170,7 +2170,7 @@
                 </a:solidFill>
               </a:rPr>
               <a:pPr/>
-              <a:t>2/12/2014</a:t>
+              <a:t>2/14/2014</a:t>
             </a:fld>
             <a:endParaRPr lang="en-US">
               <a:solidFill>
@@ -2624,7 +2624,7 @@
                 </a:solidFill>
               </a:rPr>
               <a:pPr/>
-              <a:t>2/12/2014</a:t>
+              <a:t>2/14/2014</a:t>
             </a:fld>
             <a:endParaRPr lang="en-US">
               <a:solidFill>
@@ -2774,7 +2774,7 @@
                 </a:solidFill>
               </a:rPr>
               <a:pPr/>
-              <a:t>2/12/2014</a:t>
+              <a:t>2/14/2014</a:t>
             </a:fld>
             <a:endParaRPr lang="en-US">
               <a:solidFill>
@@ -2901,7 +2901,7 @@
                 </a:solidFill>
               </a:rPr>
               <a:pPr/>
-              <a:t>2/12/2014</a:t>
+              <a:t>2/14/2014</a:t>
             </a:fld>
             <a:endParaRPr lang="en-US">
               <a:solidFill>
@@ -3210,7 +3210,7 @@
                 </a:solidFill>
               </a:rPr>
               <a:pPr/>
-              <a:t>2/12/2014</a:t>
+              <a:t>2/14/2014</a:t>
             </a:fld>
             <a:endParaRPr lang="en-US">
               <a:solidFill>
@@ -3405,7 +3405,7 @@
           <a:p>
             <a:fld id="{A66DBF1E-15DC-40BE-AE96-A63F45FD4F4E}" type="datetimeFigureOut">
               <a:rPr lang="en-SG" smtClean="0"/>
-              <a:t>12/2/2014</a:t>
+              <a:t>14/2/2014</a:t>
             </a:fld>
             <a:endParaRPr lang="en-SG"/>
           </a:p>
@@ -3665,7 +3665,7 @@
                 </a:solidFill>
               </a:rPr>
               <a:pPr/>
-              <a:t>2/12/2014</a:t>
+              <a:t>2/14/2014</a:t>
             </a:fld>
             <a:endParaRPr lang="en-US">
               <a:solidFill>
@@ -3867,7 +3867,7 @@
                 </a:solidFill>
               </a:rPr>
               <a:pPr/>
-              <a:t>2/12/2014</a:t>
+              <a:t>2/14/2014</a:t>
             </a:fld>
             <a:endParaRPr lang="en-US">
               <a:solidFill>
@@ -4079,7 +4079,7 @@
                 </a:solidFill>
               </a:rPr>
               <a:pPr/>
-              <a:t>2/12/2014</a:t>
+              <a:t>2/14/2014</a:t>
             </a:fld>
             <a:endParaRPr lang="en-US">
               <a:solidFill>
@@ -4353,7 +4353,7 @@
                 </a:solidFill>
               </a:rPr>
               <a:pPr/>
-              <a:t>12/2/2014</a:t>
+              <a:t>14/2/2014</a:t>
             </a:fld>
             <a:endParaRPr lang="en-SG">
               <a:solidFill>
@@ -4555,7 +4555,7 @@
                 </a:solidFill>
               </a:rPr>
               <a:pPr/>
-              <a:t>12/2/2014</a:t>
+              <a:t>14/2/2014</a:t>
             </a:fld>
             <a:endParaRPr lang="en-SG">
               <a:solidFill>
@@ -4833,7 +4833,7 @@
                 </a:solidFill>
               </a:rPr>
               <a:pPr/>
-              <a:t>12/2/2014</a:t>
+              <a:t>14/2/2014</a:t>
             </a:fld>
             <a:endParaRPr lang="en-SG">
               <a:solidFill>
@@ -5153,7 +5153,7 @@
                 </a:solidFill>
               </a:rPr>
               <a:pPr/>
-              <a:t>12/2/2014</a:t>
+              <a:t>14/2/2014</a:t>
             </a:fld>
             <a:endParaRPr lang="en-SG">
               <a:solidFill>
@@ -5607,7 +5607,7 @@
                 </a:solidFill>
               </a:rPr>
               <a:pPr/>
-              <a:t>12/2/2014</a:t>
+              <a:t>14/2/2014</a:t>
             </a:fld>
             <a:endParaRPr lang="en-SG">
               <a:solidFill>
@@ -5757,7 +5757,7 @@
                 </a:solidFill>
               </a:rPr>
               <a:pPr/>
-              <a:t>12/2/2014</a:t>
+              <a:t>14/2/2014</a:t>
             </a:fld>
             <a:endParaRPr lang="en-SG">
               <a:solidFill>
@@ -5884,7 +5884,7 @@
                 </a:solidFill>
               </a:rPr>
               <a:pPr/>
-              <a:t>12/2/2014</a:t>
+              <a:t>14/2/2014</a:t>
             </a:fld>
             <a:endParaRPr lang="en-SG">
               <a:solidFill>
@@ -6155,7 +6155,7 @@
           <a:p>
             <a:fld id="{A66DBF1E-15DC-40BE-AE96-A63F45FD4F4E}" type="datetimeFigureOut">
               <a:rPr lang="en-SG" smtClean="0"/>
-              <a:t>12/2/2014</a:t>
+              <a:t>14/2/2014</a:t>
             </a:fld>
             <a:endParaRPr lang="en-SG"/>
           </a:p>
@@ -6439,7 +6439,7 @@
                 </a:solidFill>
               </a:rPr>
               <a:pPr/>
-              <a:t>12/2/2014</a:t>
+              <a:t>14/2/2014</a:t>
             </a:fld>
             <a:endParaRPr lang="en-SG">
               <a:solidFill>
@@ -6724,7 +6724,7 @@
                 </a:solidFill>
               </a:rPr>
               <a:pPr/>
-              <a:t>12/2/2014</a:t>
+              <a:t>14/2/2014</a:t>
             </a:fld>
             <a:endParaRPr lang="en-SG">
               <a:solidFill>
@@ -6926,7 +6926,7 @@
                 </a:solidFill>
               </a:rPr>
               <a:pPr/>
-              <a:t>12/2/2014</a:t>
+              <a:t>14/2/2014</a:t>
             </a:fld>
             <a:endParaRPr lang="en-SG">
               <a:solidFill>
@@ -7138,7 +7138,7 @@
                 </a:solidFill>
               </a:rPr>
               <a:pPr/>
-              <a:t>12/2/2014</a:t>
+              <a:t>14/2/2014</a:t>
             </a:fld>
             <a:endParaRPr lang="en-SG">
               <a:solidFill>
@@ -7412,7 +7412,7 @@
                 </a:solidFill>
               </a:rPr>
               <a:pPr/>
-              <a:t>12/2/2014</a:t>
+              <a:t>14/2/2014</a:t>
             </a:fld>
             <a:endParaRPr lang="en-SG">
               <a:solidFill>
@@ -7614,7 +7614,7 @@
                 </a:solidFill>
               </a:rPr>
               <a:pPr/>
-              <a:t>12/2/2014</a:t>
+              <a:t>14/2/2014</a:t>
             </a:fld>
             <a:endParaRPr lang="en-SG">
               <a:solidFill>
@@ -7892,7 +7892,7 @@
                 </a:solidFill>
               </a:rPr>
               <a:pPr/>
-              <a:t>12/2/2014</a:t>
+              <a:t>14/2/2014</a:t>
             </a:fld>
             <a:endParaRPr lang="en-SG">
               <a:solidFill>
@@ -8212,7 +8212,7 @@
                 </a:solidFill>
               </a:rPr>
               <a:pPr/>
-              <a:t>12/2/2014</a:t>
+              <a:t>14/2/2014</a:t>
             </a:fld>
             <a:endParaRPr lang="en-SG">
               <a:solidFill>
@@ -8666,7 +8666,7 @@
                 </a:solidFill>
               </a:rPr>
               <a:pPr/>
-              <a:t>12/2/2014</a:t>
+              <a:t>14/2/2014</a:t>
             </a:fld>
             <a:endParaRPr lang="en-SG">
               <a:solidFill>
@@ -8816,7 +8816,7 @@
                 </a:solidFill>
               </a:rPr>
               <a:pPr/>
-              <a:t>12/2/2014</a:t>
+              <a:t>14/2/2014</a:t>
             </a:fld>
             <a:endParaRPr lang="en-SG">
               <a:solidFill>
@@ -9129,7 +9129,7 @@
           <a:p>
             <a:fld id="{A66DBF1E-15DC-40BE-AE96-A63F45FD4F4E}" type="datetimeFigureOut">
               <a:rPr lang="en-SG" smtClean="0"/>
-              <a:t>12/2/2014</a:t>
+              <a:t>14/2/2014</a:t>
             </a:fld>
             <a:endParaRPr lang="en-SG"/>
           </a:p>
@@ -9231,7 +9231,7 @@
                 </a:solidFill>
               </a:rPr>
               <a:pPr/>
-              <a:t>12/2/2014</a:t>
+              <a:t>14/2/2014</a:t>
             </a:fld>
             <a:endParaRPr lang="en-SG">
               <a:solidFill>
@@ -9540,7 +9540,7 @@
                 </a:solidFill>
               </a:rPr>
               <a:pPr/>
-              <a:t>12/2/2014</a:t>
+              <a:t>14/2/2014</a:t>
             </a:fld>
             <a:endParaRPr lang="en-SG">
               <a:solidFill>
@@ -9825,7 +9825,7 @@
                 </a:solidFill>
               </a:rPr>
               <a:pPr/>
-              <a:t>12/2/2014</a:t>
+              <a:t>14/2/2014</a:t>
             </a:fld>
             <a:endParaRPr lang="en-SG">
               <a:solidFill>
@@ -10027,7 +10027,7 @@
                 </a:solidFill>
               </a:rPr>
               <a:pPr/>
-              <a:t>12/2/2014</a:t>
+              <a:t>14/2/2014</a:t>
             </a:fld>
             <a:endParaRPr lang="en-SG">
               <a:solidFill>
@@ -10239,7 +10239,7 @@
                 </a:solidFill>
               </a:rPr>
               <a:pPr/>
-              <a:t>12/2/2014</a:t>
+              <a:t>14/2/2014</a:t>
             </a:fld>
             <a:endParaRPr lang="en-SG">
               <a:solidFill>
@@ -10513,7 +10513,7 @@
                 </a:solidFill>
               </a:rPr>
               <a:pPr/>
-              <a:t>12/2/2014</a:t>
+              <a:t>14/2/2014</a:t>
             </a:fld>
             <a:endParaRPr lang="en-SG">
               <a:solidFill>
@@ -10715,7 +10715,7 @@
                 </a:solidFill>
               </a:rPr>
               <a:pPr/>
-              <a:t>12/2/2014</a:t>
+              <a:t>14/2/2014</a:t>
             </a:fld>
             <a:endParaRPr lang="en-SG">
               <a:solidFill>
@@ -10993,7 +10993,7 @@
                 </a:solidFill>
               </a:rPr>
               <a:pPr/>
-              <a:t>12/2/2014</a:t>
+              <a:t>14/2/2014</a:t>
             </a:fld>
             <a:endParaRPr lang="en-SG">
               <a:solidFill>
@@ -11313,7 +11313,7 @@
                 </a:solidFill>
               </a:rPr>
               <a:pPr/>
-              <a:t>12/2/2014</a:t>
+              <a:t>14/2/2014</a:t>
             </a:fld>
             <a:endParaRPr lang="en-SG">
               <a:solidFill>
@@ -11767,7 +11767,7 @@
                 </a:solidFill>
               </a:rPr>
               <a:pPr/>
-              <a:t>12/2/2014</a:t>
+              <a:t>14/2/2014</a:t>
             </a:fld>
             <a:endParaRPr lang="en-SG">
               <a:solidFill>
@@ -12214,7 +12214,7 @@
           <a:p>
             <a:fld id="{A66DBF1E-15DC-40BE-AE96-A63F45FD4F4E}" type="datetimeFigureOut">
               <a:rPr lang="en-SG" smtClean="0"/>
-              <a:t>12/2/2014</a:t>
+              <a:t>14/2/2014</a:t>
             </a:fld>
             <a:endParaRPr lang="en-SG"/>
           </a:p>
@@ -12339,7 +12339,7 @@
                 </a:solidFill>
               </a:rPr>
               <a:pPr/>
-              <a:t>12/2/2014</a:t>
+              <a:t>14/2/2014</a:t>
             </a:fld>
             <a:endParaRPr lang="en-SG">
               <a:solidFill>
@@ -12466,7 +12466,7 @@
                 </a:solidFill>
               </a:rPr>
               <a:pPr/>
-              <a:t>12/2/2014</a:t>
+              <a:t>14/2/2014</a:t>
             </a:fld>
             <a:endParaRPr lang="en-SG">
               <a:solidFill>
@@ -12775,7 +12775,7 @@
                 </a:solidFill>
               </a:rPr>
               <a:pPr/>
-              <a:t>12/2/2014</a:t>
+              <a:t>14/2/2014</a:t>
             </a:fld>
             <a:endParaRPr lang="en-SG">
               <a:solidFill>
@@ -13060,7 +13060,7 @@
                 </a:solidFill>
               </a:rPr>
               <a:pPr/>
-              <a:t>12/2/2014</a:t>
+              <a:t>14/2/2014</a:t>
             </a:fld>
             <a:endParaRPr lang="en-SG">
               <a:solidFill>
@@ -13262,7 +13262,7 @@
                 </a:solidFill>
               </a:rPr>
               <a:pPr/>
-              <a:t>12/2/2014</a:t>
+              <a:t>14/2/2014</a:t>
             </a:fld>
             <a:endParaRPr lang="en-SG">
               <a:solidFill>
@@ -13474,7 +13474,7 @@
                 </a:solidFill>
               </a:rPr>
               <a:pPr/>
-              <a:t>12/2/2014</a:t>
+              <a:t>14/2/2014</a:t>
             </a:fld>
             <a:endParaRPr lang="en-SG">
               <a:solidFill>
@@ -13748,7 +13748,7 @@
                 </a:solidFill>
               </a:rPr>
               <a:pPr/>
-              <a:t>12/2/2014</a:t>
+              <a:t>14/2/2014</a:t>
             </a:fld>
             <a:endParaRPr lang="en-SG">
               <a:solidFill>
@@ -13950,7 +13950,7 @@
                 </a:solidFill>
               </a:rPr>
               <a:pPr/>
-              <a:t>12/2/2014</a:t>
+              <a:t>14/2/2014</a:t>
             </a:fld>
             <a:endParaRPr lang="en-SG">
               <a:solidFill>
@@ -14228,7 +14228,7 @@
                 </a:solidFill>
               </a:rPr>
               <a:pPr/>
-              <a:t>12/2/2014</a:t>
+              <a:t>14/2/2014</a:t>
             </a:fld>
             <a:endParaRPr lang="en-SG">
               <a:solidFill>
@@ -14548,7 +14548,7 @@
                 </a:solidFill>
               </a:rPr>
               <a:pPr/>
-              <a:t>12/2/2014</a:t>
+              <a:t>14/2/2014</a:t>
             </a:fld>
             <a:endParaRPr lang="en-SG">
               <a:solidFill>
@@ -14691,7 +14691,7 @@
           <a:p>
             <a:fld id="{A66DBF1E-15DC-40BE-AE96-A63F45FD4F4E}" type="datetimeFigureOut">
               <a:rPr lang="en-SG" smtClean="0"/>
-              <a:t>12/2/2014</a:t>
+              <a:t>14/2/2014</a:t>
             </a:fld>
             <a:endParaRPr lang="en-SG"/>
           </a:p>
@@ -15120,7 +15120,7 @@
                 </a:solidFill>
               </a:rPr>
               <a:pPr/>
-              <a:t>12/2/2014</a:t>
+              <a:t>14/2/2014</a:t>
             </a:fld>
             <a:endParaRPr lang="en-SG">
               <a:solidFill>
@@ -15270,7 +15270,7 @@
                 </a:solidFill>
               </a:rPr>
               <a:pPr/>
-              <a:t>12/2/2014</a:t>
+              <a:t>14/2/2014</a:t>
             </a:fld>
             <a:endParaRPr lang="en-SG">
               <a:solidFill>
@@ -15397,7 +15397,7 @@
                 </a:solidFill>
               </a:rPr>
               <a:pPr/>
-              <a:t>12/2/2014</a:t>
+              <a:t>14/2/2014</a:t>
             </a:fld>
             <a:endParaRPr lang="en-SG">
               <a:solidFill>
@@ -15706,7 +15706,7 @@
                 </a:solidFill>
               </a:rPr>
               <a:pPr/>
-              <a:t>12/2/2014</a:t>
+              <a:t>14/2/2014</a:t>
             </a:fld>
             <a:endParaRPr lang="en-SG">
               <a:solidFill>
@@ -15991,7 +15991,7 @@
                 </a:solidFill>
               </a:rPr>
               <a:pPr/>
-              <a:t>12/2/2014</a:t>
+              <a:t>14/2/2014</a:t>
             </a:fld>
             <a:endParaRPr lang="en-SG">
               <a:solidFill>
@@ -16193,7 +16193,7 @@
                 </a:solidFill>
               </a:rPr>
               <a:pPr/>
-              <a:t>12/2/2014</a:t>
+              <a:t>14/2/2014</a:t>
             </a:fld>
             <a:endParaRPr lang="en-SG">
               <a:solidFill>
@@ -16405,7 +16405,7 @@
                 </a:solidFill>
               </a:rPr>
               <a:pPr/>
-              <a:t>12/2/2014</a:t>
+              <a:t>14/2/2014</a:t>
             </a:fld>
             <a:endParaRPr lang="en-SG">
               <a:solidFill>
@@ -16525,7 +16525,7 @@
           <a:p>
             <a:fld id="{A66DBF1E-15DC-40BE-AE96-A63F45FD4F4E}" type="datetimeFigureOut">
               <a:rPr lang="en-SG" smtClean="0"/>
-              <a:t>12/2/2014</a:t>
+              <a:t>14/2/2014</a:t>
             </a:fld>
             <a:endParaRPr lang="en-SG"/>
           </a:p>
@@ -16802,7 +16802,7 @@
           <a:p>
             <a:fld id="{A66DBF1E-15DC-40BE-AE96-A63F45FD4F4E}" type="datetimeFigureOut">
               <a:rPr lang="en-SG" smtClean="0"/>
-              <a:t>12/2/2014</a:t>
+              <a:t>14/2/2014</a:t>
             </a:fld>
             <a:endParaRPr lang="en-SG"/>
           </a:p>
@@ -17055,7 +17055,7 @@
           <a:p>
             <a:fld id="{A66DBF1E-15DC-40BE-AE96-A63F45FD4F4E}" type="datetimeFigureOut">
               <a:rPr lang="en-SG" smtClean="0"/>
-              <a:t>12/2/2014</a:t>
+              <a:t>14/2/2014</a:t>
             </a:fld>
             <a:endParaRPr lang="en-SG"/>
           </a:p>
@@ -17268,7 +17268,7 @@
           <a:p>
             <a:fld id="{A66DBF1E-15DC-40BE-AE96-A63F45FD4F4E}" type="datetimeFigureOut">
               <a:rPr lang="en-SG" smtClean="0"/>
-              <a:t>12/2/2014</a:t>
+              <a:t>14/2/2014</a:t>
             </a:fld>
             <a:endParaRPr lang="en-SG"/>
           </a:p>
@@ -17785,7 +17785,7 @@
                 </a:solidFill>
               </a:rPr>
               <a:pPr/>
-              <a:t>2/12/2014</a:t>
+              <a:t>2/14/2014</a:t>
             </a:fld>
             <a:endParaRPr lang="en-US">
               <a:solidFill>
@@ -18327,7 +18327,7 @@
                 </a:solidFill>
               </a:rPr>
               <a:pPr/>
-              <a:t>12/2/2014</a:t>
+              <a:t>14/2/2014</a:t>
             </a:fld>
             <a:endParaRPr lang="en-SG">
               <a:solidFill>
@@ -18869,7 +18869,7 @@
                 </a:solidFill>
               </a:rPr>
               <a:pPr/>
-              <a:t>12/2/2014</a:t>
+              <a:t>14/2/2014</a:t>
             </a:fld>
             <a:endParaRPr lang="en-SG">
               <a:solidFill>
@@ -19411,7 +19411,7 @@
                 </a:solidFill>
               </a:rPr>
               <a:pPr/>
-              <a:t>12/2/2014</a:t>
+              <a:t>14/2/2014</a:t>
             </a:fld>
             <a:endParaRPr lang="en-SG">
               <a:solidFill>
@@ -19953,7 +19953,7 @@
                 </a:solidFill>
               </a:rPr>
               <a:pPr/>
-              <a:t>12/2/2014</a:t>
+              <a:t>14/2/2014</a:t>
             </a:fld>
             <a:endParaRPr lang="en-SG">
               <a:solidFill>
@@ -25600,6 +25600,89 @@
           </a:p>
         </p:txBody>
       </p:sp>
+      <p:pic>
+        <p:nvPicPr>
+          <p:cNvPr id="5" name="PowerPointLabs Speech 0">
+            <a:hlinkClick r:id="" action="ppaction://media"/>
+          </p:cNvPr>
+          <p:cNvPicPr>
+            <a:picLocks noChangeAspect="1"/>
+          </p:cNvPicPr>
+          <p:nvPr>
+            <a:audioFile r:link="rId2"/>
+            <p:extLst>
+              <p:ext uri="{DAA4B4D4-6D71-4841-9C94-3DE7FCFB9230}">
+                <p14:media xmlns:p14="http://schemas.microsoft.com/office/powerpoint/2010/main" r:embed="rId1"/>
+              </p:ext>
+            </p:extLst>
+          </p:nvPr>
+        </p:nvPicPr>
+        <p:blipFill>
+          <a:blip r:embed="rId5"/>
+          <a:stretch>
+            <a:fillRect/>
+          </a:stretch>
+        </p:blipFill>
+        <p:spPr>
+          <a:xfrm>
+            <a:off x="9398000" y="0"/>
+            <a:ext cx="609600" cy="609600"/>
+          </a:xfrm>
+          <a:prstGeom prst="rect">
+            <a:avLst/>
+          </a:prstGeom>
+        </p:spPr>
+      </p:pic>
+      <p:sp>
+        <p:nvSpPr>
+          <p:cNvPr id="6" name="PowerPointLabs Caption 0"/>
+          <p:cNvSpPr txBox="1"/>
+          <p:nvPr/>
+        </p:nvSpPr>
+        <p:spPr>
+          <a:xfrm>
+            <a:off x="0" y="6581001"/>
+            <a:ext cx="9144000" cy="276999"/>
+          </a:xfrm>
+          <a:prstGeom prst="rect">
+            <a:avLst/>
+          </a:prstGeom>
+          <a:pattFill prst="pct5">
+            <a:fgClr>
+              <a:srgbClr val="000000">
+                <a:alpha val="80000"/>
+              </a:srgbClr>
+            </a:fgClr>
+            <a:bgClr>
+              <a:srgbClr val="000000">
+                <a:alpha val="80000"/>
+              </a:srgbClr>
+            </a:bgClr>
+          </a:pattFill>
+        </p:spPr>
+        <p:txBody>
+          <a:bodyPr vert="horz" wrap="square" rtlCol="0">
+            <a:spAutoFit/>
+          </a:bodyPr>
+          <a:lstStyle/>
+          <a:p>
+            <a:pPr algn="ctr"/>
+            <a:r>
+              <a:rPr lang="en-US" sz="1200" smtClean="0">
+                <a:solidFill>
+                  <a:srgbClr val="FFFFFF"/>
+                </a:solidFill>
+              </a:rPr>
+              <a:t>This slide has some text in the notes.</a:t>
+            </a:r>
+            <a:endParaRPr lang="en-US" sz="1200">
+              <a:solidFill>
+                <a:srgbClr val="FFFFFF"/>
+              </a:solidFill>
+            </a:endParaRPr>
+          </a:p>
+        </p:txBody>
+      </p:sp>
     </p:spTree>
     <p:extLst>
       <p:ext uri="{BB962C8B-B14F-4D97-AF65-F5344CB8AC3E}">
@@ -25621,7 +25704,87 @@
   <p:timing>
     <p:tnLst>
       <p:par>
-        <p:cTn id="1" dur="indefinite" restart="never" nodeType="tmRoot"/>
+        <p:cTn id="1" dur="indefinite" restart="never" nodeType="tmRoot">
+          <p:childTnLst>
+            <p:seq concurrent="1" nextAc="seek">
+              <p:cTn id="2" dur="indefinite" nodeType="mainSeq">
+                <p:childTnLst>
+                  <p:par>
+                    <p:cTn id="3" fill="hold">
+                      <p:stCondLst>
+                        <p:cond delay="indefinite"/>
+                        <p:cond evt="onBegin" delay="0">
+                          <p:tn val="2"/>
+                        </p:cond>
+                      </p:stCondLst>
+                      <p:childTnLst>
+                        <p:par>
+                          <p:cTn id="4" fill="hold">
+                            <p:stCondLst>
+                              <p:cond delay="0"/>
+                            </p:stCondLst>
+                            <p:childTnLst>
+                              <p:par>
+                                <p:cTn id="5" presetID="1" presetClass="mediacall" presetSubtype="0" fill="hold" nodeType="withEffect">
+                                  <p:stCondLst>
+                                    <p:cond delay="0"/>
+                                  </p:stCondLst>
+                                  <p:childTnLst>
+                                    <p:cmd type="call" cmd="playFrom(0.0)">
+                                      <p:cBhvr>
+                                        <p:cTn id="6" dur="2814" fill="hold"/>
+                                        <p:tgtEl>
+                                          <p:spTgt spid="5"/>
+                                        </p:tgtEl>
+                                      </p:cBhvr>
+                                    </p:cmd>
+                                  </p:childTnLst>
+                                </p:cTn>
+                              </p:par>
+                            </p:childTnLst>
+                          </p:cTn>
+                        </p:par>
+                      </p:childTnLst>
+                    </p:cTn>
+                  </p:par>
+                </p:childTnLst>
+              </p:cTn>
+              <p:prevCondLst>
+                <p:cond evt="onPrev" delay="0">
+                  <p:tgtEl>
+                    <p:sldTgt/>
+                  </p:tgtEl>
+                </p:cond>
+              </p:prevCondLst>
+              <p:nextCondLst>
+                <p:cond evt="onNext" delay="0">
+                  <p:tgtEl>
+                    <p:sldTgt/>
+                  </p:tgtEl>
+                </p:cond>
+              </p:nextCondLst>
+            </p:seq>
+            <p:audio>
+              <p:cMediaNode vol="80000">
+                <p:cTn id="7" fill="hold" display="0">
+                  <p:stCondLst>
+                    <p:cond delay="indefinite"/>
+                  </p:stCondLst>
+                  <p:endCondLst>
+                    <p:cond evt="onStopAudio" delay="0">
+                      <p:tgtEl>
+                        <p:sldTgt/>
+                      </p:tgtEl>
+                    </p:cond>
+                  </p:endCondLst>
+                </p:cTn>
+                <p:tgtEl>
+                  <p:spTgt spid="5"/>
+                </p:tgtEl>
+              </p:cMediaNode>
+            </p:audio>
+          </p:childTnLst>
+        </p:cTn>
       </p:par>
     </p:tnLst>
   </p:timing>

</xml_diff>